<commit_message>
inclusao nome autor ppt
</commit_message>
<xml_diff>
--- a/Repasse Educor/Dia 02 - Primeiro jogo/01 - SpaceShooter.pptx
+++ b/Repasse Educor/Dia 02 - Primeiro jogo/01 - SpaceShooter.pptx
@@ -4054,57 +4054,220 @@
       </p:sp>
       <p:sp>
         <p:nvSpPr>
-          <p:cNvPr id="20" name="CaixaDeTexto 19">
+          <p:cNvPr id="8" name="Content Placeholder 10">
             <a:extLst>
               <a:ext uri="{FF2B5EF4-FFF2-40B4-BE49-F238E27FC236}">
-                <a16:creationId xmlns:a16="http://schemas.microsoft.com/office/drawing/2014/main" id="{CDB19975-49BF-4DE5-BF25-75889A5BBED7}"/>
+                <a16:creationId xmlns:a16="http://schemas.microsoft.com/office/drawing/2014/main" id="{0D112D6F-7157-4243-94D9-1D144CBF5763}"/>
               </a:ext>
             </a:extLst>
           </p:cNvPr>
-          <p:cNvSpPr txBox="1"/>
+          <p:cNvSpPr txBox="1">
+            <a:spLocks/>
+          </p:cNvSpPr>
           <p:nvPr/>
         </p:nvSpPr>
         <p:spPr>
           <a:xfrm>
-            <a:off x="5640542" y="5487896"/>
-            <a:ext cx="6402977" cy="1294585"/>
+            <a:off x="8610738" y="6142711"/>
+            <a:ext cx="3578214" cy="715289"/>
           </a:xfrm>
           <a:prstGeom prst="rect">
             <a:avLst/>
           </a:prstGeom>
-          <a:noFill/>
         </p:spPr>
         <p:txBody>
-          <a:bodyPr wrap="square">
-            <a:spAutoFit/>
+          <a:bodyPr vert="horz" lIns="91440" tIns="45720" rIns="91440" bIns="45720" rtlCol="0" anchor="t">
+            <a:normAutofit fontScale="92500" lnSpcReduction="10000"/>
           </a:bodyPr>
-          <a:lstStyle/>
-          <a:p>
-            <a:pPr marL="114300">
-              <a:lnSpc>
-                <a:spcPct val="150000"/>
-              </a:lnSpc>
+          <a:lstStyle>
+            <a:lvl1pPr marL="228600" indent="-228600" algn="l" defTabSz="914400" rtl="0" eaLnBrk="1" latinLnBrk="0" hangingPunct="1">
+              <a:lnSpc>
+                <a:spcPct val="90000"/>
+              </a:lnSpc>
+              <a:spcBef>
+                <a:spcPts val="1000"/>
+              </a:spcBef>
+              <a:buFont typeface="Arial" panose="020B0604020202020204" pitchFamily="34" charset="0"/>
+              <a:buChar char="•"/>
+              <a:defRPr sz="2800" kern="1200">
+                <a:solidFill>
+                  <a:schemeClr val="tx1"/>
+                </a:solidFill>
+                <a:latin typeface="+mn-lt"/>
+                <a:ea typeface="+mn-ea"/>
+                <a:cs typeface="+mn-cs"/>
+              </a:defRPr>
+            </a:lvl1pPr>
+            <a:lvl2pPr marL="685800" indent="-228600" algn="l" defTabSz="914400" rtl="0" eaLnBrk="1" latinLnBrk="0" hangingPunct="1">
+              <a:lnSpc>
+                <a:spcPct val="90000"/>
+              </a:lnSpc>
+              <a:spcBef>
+                <a:spcPts val="500"/>
+              </a:spcBef>
+              <a:buFont typeface="Arial" panose="020B0604020202020204" pitchFamily="34" charset="0"/>
+              <a:buChar char="•"/>
+              <a:defRPr sz="2400" kern="1200">
+                <a:solidFill>
+                  <a:schemeClr val="tx1"/>
+                </a:solidFill>
+                <a:latin typeface="+mn-lt"/>
+                <a:ea typeface="+mn-ea"/>
+                <a:cs typeface="+mn-cs"/>
+              </a:defRPr>
+            </a:lvl2pPr>
+            <a:lvl3pPr marL="1143000" indent="-228600" algn="l" defTabSz="914400" rtl="0" eaLnBrk="1" latinLnBrk="0" hangingPunct="1">
+              <a:lnSpc>
+                <a:spcPct val="90000"/>
+              </a:lnSpc>
+              <a:spcBef>
+                <a:spcPts val="500"/>
+              </a:spcBef>
+              <a:buFont typeface="Arial" panose="020B0604020202020204" pitchFamily="34" charset="0"/>
+              <a:buChar char="•"/>
+              <a:defRPr sz="2000" kern="1200">
+                <a:solidFill>
+                  <a:schemeClr val="tx1"/>
+                </a:solidFill>
+                <a:latin typeface="+mn-lt"/>
+                <a:ea typeface="+mn-ea"/>
+                <a:cs typeface="+mn-cs"/>
+              </a:defRPr>
+            </a:lvl3pPr>
+            <a:lvl4pPr marL="1600200" indent="-228600" algn="l" defTabSz="914400" rtl="0" eaLnBrk="1" latinLnBrk="0" hangingPunct="1">
+              <a:lnSpc>
+                <a:spcPct val="90000"/>
+              </a:lnSpc>
+              <a:spcBef>
+                <a:spcPts val="500"/>
+              </a:spcBef>
+              <a:buFont typeface="Arial" panose="020B0604020202020204" pitchFamily="34" charset="0"/>
+              <a:buChar char="•"/>
+              <a:defRPr sz="1800" kern="1200">
+                <a:solidFill>
+                  <a:schemeClr val="tx1"/>
+                </a:solidFill>
+                <a:latin typeface="+mn-lt"/>
+                <a:ea typeface="+mn-ea"/>
+                <a:cs typeface="+mn-cs"/>
+              </a:defRPr>
+            </a:lvl4pPr>
+            <a:lvl5pPr marL="2057400" indent="-228600" algn="l" defTabSz="914400" rtl="0" eaLnBrk="1" latinLnBrk="0" hangingPunct="1">
+              <a:lnSpc>
+                <a:spcPct val="90000"/>
+              </a:lnSpc>
+              <a:spcBef>
+                <a:spcPts val="500"/>
+              </a:spcBef>
+              <a:buFont typeface="Arial" panose="020B0604020202020204" pitchFamily="34" charset="0"/>
+              <a:buChar char="•"/>
+              <a:defRPr sz="1800" kern="1200">
+                <a:solidFill>
+                  <a:schemeClr val="tx1"/>
+                </a:solidFill>
+                <a:latin typeface="+mn-lt"/>
+                <a:ea typeface="+mn-ea"/>
+                <a:cs typeface="+mn-cs"/>
+              </a:defRPr>
+            </a:lvl5pPr>
+            <a:lvl6pPr marL="2514600" indent="-228600" algn="l" defTabSz="914400" rtl="0" eaLnBrk="1" latinLnBrk="0" hangingPunct="1">
+              <a:lnSpc>
+                <a:spcPct val="90000"/>
+              </a:lnSpc>
+              <a:spcBef>
+                <a:spcPts val="500"/>
+              </a:spcBef>
+              <a:buFont typeface="Arial" panose="020B0604020202020204" pitchFamily="34" charset="0"/>
+              <a:buChar char="•"/>
+              <a:defRPr sz="1800" kern="1200">
+                <a:solidFill>
+                  <a:schemeClr val="tx1"/>
+                </a:solidFill>
+                <a:latin typeface="+mn-lt"/>
+                <a:ea typeface="+mn-ea"/>
+                <a:cs typeface="+mn-cs"/>
+              </a:defRPr>
+            </a:lvl6pPr>
+            <a:lvl7pPr marL="2971800" indent="-228600" algn="l" defTabSz="914400" rtl="0" eaLnBrk="1" latinLnBrk="0" hangingPunct="1">
+              <a:lnSpc>
+                <a:spcPct val="90000"/>
+              </a:lnSpc>
+              <a:spcBef>
+                <a:spcPts val="500"/>
+              </a:spcBef>
+              <a:buFont typeface="Arial" panose="020B0604020202020204" pitchFamily="34" charset="0"/>
+              <a:buChar char="•"/>
+              <a:defRPr sz="1800" kern="1200">
+                <a:solidFill>
+                  <a:schemeClr val="tx1"/>
+                </a:solidFill>
+                <a:latin typeface="+mn-lt"/>
+                <a:ea typeface="+mn-ea"/>
+                <a:cs typeface="+mn-cs"/>
+              </a:defRPr>
+            </a:lvl7pPr>
+            <a:lvl8pPr marL="3429000" indent="-228600" algn="l" defTabSz="914400" rtl="0" eaLnBrk="1" latinLnBrk="0" hangingPunct="1">
+              <a:lnSpc>
+                <a:spcPct val="90000"/>
+              </a:lnSpc>
+              <a:spcBef>
+                <a:spcPts val="500"/>
+              </a:spcBef>
+              <a:buFont typeface="Arial" panose="020B0604020202020204" pitchFamily="34" charset="0"/>
+              <a:buChar char="•"/>
+              <a:defRPr sz="1800" kern="1200">
+                <a:solidFill>
+                  <a:schemeClr val="tx1"/>
+                </a:solidFill>
+                <a:latin typeface="+mn-lt"/>
+                <a:ea typeface="+mn-ea"/>
+                <a:cs typeface="+mn-cs"/>
+              </a:defRPr>
+            </a:lvl8pPr>
+            <a:lvl9pPr marL="3886200" indent="-228600" algn="l" defTabSz="914400" rtl="0" eaLnBrk="1" latinLnBrk="0" hangingPunct="1">
+              <a:lnSpc>
+                <a:spcPct val="90000"/>
+              </a:lnSpc>
+              <a:spcBef>
+                <a:spcPts val="500"/>
+              </a:spcBef>
+              <a:buFont typeface="Arial" panose="020B0604020202020204" pitchFamily="34" charset="0"/>
+              <a:buChar char="•"/>
+              <a:defRPr sz="1800" kern="1200">
+                <a:solidFill>
+                  <a:schemeClr val="tx1"/>
+                </a:solidFill>
+                <a:latin typeface="+mn-lt"/>
+                <a:ea typeface="+mn-ea"/>
+                <a:cs typeface="+mn-cs"/>
+              </a:defRPr>
+            </a:lvl9pPr>
+          </a:lstStyle>
+          <a:p>
+            <a:pPr marL="0" indent="0">
+              <a:buNone/>
             </a:pPr>
             <a:r>
-              <a:rPr lang="pt-BR" b="1" dirty="0">
-                <a:latin typeface="Open Sans"/>
-              </a:rPr>
-              <a:t>Fonte:</a:t>
-            </a:r>
-            <a:br>
-              <a:rPr lang="pt-BR" b="1" dirty="0">
-                <a:latin typeface="Open Sans"/>
-              </a:rPr>
-            </a:br>
-            <a:r>
-              <a:rPr lang="pt-BR" sz="1800" dirty="0">
-                <a:latin typeface="Open Sans"/>
-              </a:rPr>
-              <a:t>https://learn.unity.com/tutorial/introduction-to-space-shooter?uv=5.x&amp;projectId=5c5148e1edbc2a001fd5bdfe</a:t>
-            </a:r>
-            <a:endParaRPr lang="pt-BR" sz="4800" dirty="0">
-              <a:latin typeface="Open Sans"/>
-            </a:endParaRPr>
+              <a:rPr lang="en-US" sz="2200" dirty="0">
+                <a:solidFill>
+                  <a:srgbClr val="FFFF00"/>
+                </a:solidFill>
+              </a:rPr>
+              <a:t>Alexandre Dionizio - SJR</a:t>
+            </a:r>
+          </a:p>
+          <a:p>
+            <a:pPr marL="0" indent="0">
+              <a:buNone/>
+            </a:pPr>
+            <a:r>
+              <a:rPr lang="en-US" sz="2200" dirty="0">
+                <a:solidFill>
+                  <a:srgbClr val="FFFF00"/>
+                </a:solidFill>
+              </a:rPr>
+              <a:t>alexandre.dionizio@sp.senac.br</a:t>
+            </a:r>
           </a:p>
         </p:txBody>
       </p:sp>
@@ -16218,6 +16381,62 @@
           </a:p>
         </p:txBody>
       </p:sp>
+      <p:sp>
+        <p:nvSpPr>
+          <p:cNvPr id="6" name="CaixaDeTexto 5">
+            <a:extLst>
+              <a:ext uri="{FF2B5EF4-FFF2-40B4-BE49-F238E27FC236}">
+                <a16:creationId xmlns:a16="http://schemas.microsoft.com/office/drawing/2014/main" id="{42E28AE1-3287-4E1C-B9CB-3E1C093D4D54}"/>
+              </a:ext>
+            </a:extLst>
+          </p:cNvPr>
+          <p:cNvSpPr txBox="1"/>
+          <p:nvPr/>
+        </p:nvSpPr>
+        <p:spPr>
+          <a:xfrm>
+            <a:off x="618519" y="4066422"/>
+            <a:ext cx="3367694" cy="2125582"/>
+          </a:xfrm>
+          <a:prstGeom prst="rect">
+            <a:avLst/>
+          </a:prstGeom>
+          <a:noFill/>
+        </p:spPr>
+        <p:txBody>
+          <a:bodyPr wrap="square">
+            <a:spAutoFit/>
+          </a:bodyPr>
+          <a:lstStyle/>
+          <a:p>
+            <a:pPr marL="114300">
+              <a:lnSpc>
+                <a:spcPct val="150000"/>
+              </a:lnSpc>
+            </a:pPr>
+            <a:r>
+              <a:rPr lang="pt-BR" b="1" dirty="0">
+                <a:latin typeface="Open Sans"/>
+              </a:rPr>
+              <a:t>Fonte:</a:t>
+            </a:r>
+            <a:br>
+              <a:rPr lang="pt-BR" b="1" dirty="0">
+                <a:latin typeface="Open Sans"/>
+              </a:rPr>
+            </a:br>
+            <a:r>
+              <a:rPr lang="pt-BR" sz="1800" dirty="0">
+                <a:latin typeface="Open Sans"/>
+              </a:rPr>
+              <a:t>https://learn.unity.com/tutorial/introduction-to-space-shooter?uv=5.x&amp;projectId=5c5148e1edbc2a001fd5bdfe</a:t>
+            </a:r>
+            <a:endParaRPr lang="pt-BR" sz="4800" dirty="0">
+              <a:latin typeface="Open Sans"/>
+            </a:endParaRPr>
+          </a:p>
+        </p:txBody>
+      </p:sp>
     </p:spTree>
     <p:extLst>
       <p:ext uri="{BB962C8B-B14F-4D97-AF65-F5344CB8AC3E}">
@@ -25052,7 +25271,7 @@
                 </a:solidFill>
                 <a:latin typeface="Open Sans"/>
               </a:rPr>
-              <a:t>Agora vamos movimentar o asteroide. No script </a:t>
+              <a:t>Agora vamos movimentar o asteroide. Anexe o script </a:t>
             </a:r>
             <a:r>
               <a:rPr lang="pt-BR" sz="3600" b="1" dirty="0">
@@ -25070,7 +25289,25 @@
                 </a:solidFill>
                 <a:latin typeface="Open Sans"/>
               </a:rPr>
-              <a:t> altere o valor da variável </a:t>
+              <a:t> também ao GO </a:t>
+            </a:r>
+            <a:r>
+              <a:rPr lang="pt-BR" sz="3600" b="1" dirty="0">
+                <a:solidFill>
+                  <a:srgbClr val="455463"/>
+                </a:solidFill>
+                <a:latin typeface="Open Sans"/>
+              </a:rPr>
+              <a:t>Asteroid</a:t>
+            </a:r>
+            <a:r>
+              <a:rPr lang="pt-BR" sz="3600" dirty="0">
+                <a:solidFill>
+                  <a:srgbClr val="455463"/>
+                </a:solidFill>
+                <a:latin typeface="Open Sans"/>
+              </a:rPr>
+              <a:t> e altere o valor da variável </a:t>
             </a:r>
             <a:r>
               <a:rPr lang="pt-BR" sz="3600" b="1" dirty="0">
@@ -25169,7 +25406,25 @@
                 </a:solidFill>
                 <a:latin typeface="Open Sans"/>
               </a:rPr>
-              <a:t> e salve as alterações</a:t>
+              <a:t>, delete-o da cena e </a:t>
+            </a:r>
+            <a:r>
+              <a:rPr lang="pt-BR" sz="3600" b="1" dirty="0">
+                <a:solidFill>
+                  <a:srgbClr val="455463"/>
+                </a:solidFill>
+                <a:latin typeface="Open Sans"/>
+              </a:rPr>
+              <a:t>salve</a:t>
+            </a:r>
+            <a:r>
+              <a:rPr lang="pt-BR" sz="3600" dirty="0">
+                <a:solidFill>
+                  <a:srgbClr val="455463"/>
+                </a:solidFill>
+                <a:latin typeface="Open Sans"/>
+              </a:rPr>
+              <a:t> o projeto</a:t>
             </a:r>
           </a:p>
           <a:p>

</xml_diff>